<commit_message>
added table + writing presentation (wip)
</commit_message>
<xml_diff>
--- a/presentation/KMeansClustering.pptx
+++ b/presentation/KMeansClustering.pptx
@@ -5,10 +5,10 @@
     <p:sldMasterId id="2147483648" r:id="rId1"/>
   </p:sldMasterIdLst>
   <p:notesMasterIdLst>
-    <p:notesMasterId r:id="rId14"/>
+    <p:notesMasterId r:id="rId15"/>
   </p:notesMasterIdLst>
   <p:handoutMasterIdLst>
-    <p:handoutMasterId r:id="rId15"/>
+    <p:handoutMasterId r:id="rId16"/>
   </p:handoutMasterIdLst>
   <p:sldIdLst>
     <p:sldId id="256" r:id="rId2"/>
@@ -21,8 +21,9 @@
     <p:sldId id="263" r:id="rId9"/>
     <p:sldId id="264" r:id="rId10"/>
     <p:sldId id="265" r:id="rId11"/>
-    <p:sldId id="267" r:id="rId12"/>
-    <p:sldId id="268" r:id="rId13"/>
+    <p:sldId id="269" r:id="rId12"/>
+    <p:sldId id="267" r:id="rId13"/>
+    <p:sldId id="268" r:id="rId14"/>
   </p:sldIdLst>
   <p:sldSz cx="9144000" cy="6858000" type="screen4x3"/>
   <p:notesSz cx="6858000" cy="9144000"/>
@@ -140,6 +141,7 @@
             <p14:sldId id="263"/>
             <p14:sldId id="264"/>
             <p14:sldId id="265"/>
+            <p14:sldId id="269"/>
             <p14:sldId id="267"/>
             <p14:sldId id="268"/>
           </p14:sldIdLst>
@@ -844,7 +846,7 @@
     </p:spTree>
     <p:extLst>
       <p:ext uri="{BB962C8B-B14F-4D97-AF65-F5344CB8AC3E}">
-        <p14:creationId xmlns:p14="http://schemas.microsoft.com/office/powerpoint/2010/main" val="2956334855"/>
+        <p14:creationId xmlns:p14="http://schemas.microsoft.com/office/powerpoint/2010/main" val="922020138"/>
       </p:ext>
     </p:extLst>
   </p:cSld>
@@ -921,6 +923,91 @@
               <a:rPr lang="it-IT" smtClean="0"/>
               <a:pPr/>
               <a:t>12</a:t>
+            </a:fld>
+            <a:endParaRPr lang="it-IT"/>
+          </a:p>
+        </p:txBody>
+      </p:sp>
+    </p:spTree>
+    <p:extLst>
+      <p:ext uri="{BB962C8B-B14F-4D97-AF65-F5344CB8AC3E}">
+        <p14:creationId xmlns:p14="http://schemas.microsoft.com/office/powerpoint/2010/main" val="2956334855"/>
+      </p:ext>
+    </p:extLst>
+  </p:cSld>
+  <p:clrMapOvr>
+    <a:masterClrMapping/>
+  </p:clrMapOvr>
+</p:notes>
+</file>
+
+<file path=ppt/notesSlides/notesSlide12.xml><?xml version="1.0" encoding="utf-8"?>
+<p:notes xmlns:a="http://schemas.openxmlformats.org/drawingml/2006/main" xmlns:r="http://schemas.openxmlformats.org/officeDocument/2006/relationships" xmlns:p="http://schemas.openxmlformats.org/presentationml/2006/main">
+  <p:cSld>
+    <p:spTree>
+      <p:nvGrpSpPr>
+        <p:cNvPr id="1" name=""/>
+        <p:cNvGrpSpPr/>
+        <p:nvPr/>
+      </p:nvGrpSpPr>
+      <p:grpSpPr>
+        <a:xfrm>
+          <a:off x="0" y="0"/>
+          <a:ext cx="0" cy="0"/>
+          <a:chOff x="0" y="0"/>
+          <a:chExt cx="0" cy="0"/>
+        </a:xfrm>
+      </p:grpSpPr>
+      <p:sp>
+        <p:nvSpPr>
+          <p:cNvPr id="2" name="Segnaposto immagine diapositiva 1"/>
+          <p:cNvSpPr>
+            <a:spLocks noGrp="1" noRot="1" noChangeAspect="1"/>
+          </p:cNvSpPr>
+          <p:nvPr>
+            <p:ph type="sldImg"/>
+          </p:nvPr>
+        </p:nvSpPr>
+        <p:spPr/>
+      </p:sp>
+      <p:sp>
+        <p:nvSpPr>
+          <p:cNvPr id="3" name="Segnaposto note 2"/>
+          <p:cNvSpPr>
+            <a:spLocks noGrp="1"/>
+          </p:cNvSpPr>
+          <p:nvPr>
+            <p:ph type="body" idx="1"/>
+          </p:nvPr>
+        </p:nvSpPr>
+        <p:spPr/>
+        <p:txBody>
+          <a:bodyPr/>
+          <a:lstStyle/>
+          <a:p>
+            <a:endParaRPr lang="it-IT"/>
+          </a:p>
+        </p:txBody>
+      </p:sp>
+      <p:sp>
+        <p:nvSpPr>
+          <p:cNvPr id="4" name="Segnaposto numero diapositiva 3"/>
+          <p:cNvSpPr>
+            <a:spLocks noGrp="1"/>
+          </p:cNvSpPr>
+          <p:nvPr>
+            <p:ph type="sldNum" sz="quarter" idx="10"/>
+          </p:nvPr>
+        </p:nvSpPr>
+        <p:spPr/>
+        <p:txBody>
+          <a:bodyPr/>
+          <a:lstStyle/>
+          <a:p>
+            <a:fld id="{96986711-015B-0142-88C4-65D50E44FA77}" type="slidenum">
+              <a:rPr lang="it-IT" smtClean="0"/>
+              <a:pPr/>
+              <a:t>13</a:t>
             </a:fld>
             <a:endParaRPr lang="it-IT"/>
           </a:p>
@@ -5509,7 +5596,7 @@
         <p:spPr>
           <a:xfrm>
             <a:off x="648253" y="1305402"/>
-            <a:ext cx="5196702" cy="461665"/>
+            <a:ext cx="5196702" cy="830997"/>
           </a:xfrm>
           <a:prstGeom prst="rect">
             <a:avLst/>
@@ -5547,6 +5634,17 @@
               <a:t> Analysis</a:t>
             </a:r>
           </a:p>
+          <a:p>
+            <a:endParaRPr lang="it-IT" sz="2400" b="1" dirty="0">
+              <a:solidFill>
+                <a:schemeClr val="accent1">
+                  <a:lumMod val="75000"/>
+                </a:schemeClr>
+              </a:solidFill>
+              <a:latin typeface="Arial"/>
+              <a:cs typeface="Arial"/>
+            </a:endParaRPr>
+          </a:p>
         </p:txBody>
       </p:sp>
       <p:sp>
@@ -5558,7 +5656,7 @@
         <p:spPr>
           <a:xfrm>
             <a:off x="648253" y="1705113"/>
-            <a:ext cx="4117474" cy="369332"/>
+            <a:ext cx="1146468" cy="369332"/>
           </a:xfrm>
           <a:prstGeom prst="rect">
             <a:avLst/>
@@ -5572,46 +5670,60 @@
           <a:lstStyle/>
           <a:p>
             <a:r>
-              <a:rPr lang="it-IT" dirty="0" err="1">
-                <a:latin typeface="Arial"/>
-                <a:cs typeface="Arial"/>
-              </a:rPr>
-              <a:t>Speedup</a:t>
-            </a:r>
-            <a:r>
               <a:rPr lang="it-IT" dirty="0">
                 <a:latin typeface="Arial"/>
                 <a:cs typeface="Arial"/>
               </a:rPr>
-              <a:t> </a:t>
-            </a:r>
-            <a:r>
-              <a:rPr lang="it-IT" dirty="0" err="1">
-                <a:latin typeface="Arial"/>
-                <a:cs typeface="Arial"/>
-              </a:rPr>
-              <a:t>results</a:t>
-            </a:r>
-            <a:r>
-              <a:rPr lang="it-IT" dirty="0">
-                <a:latin typeface="Arial"/>
-                <a:cs typeface="Arial"/>
-              </a:rPr>
-              <a:t> with </a:t>
-            </a:r>
-            <a:r>
-              <a:rPr lang="it-IT" dirty="0" err="1">
-                <a:latin typeface="Arial"/>
-                <a:cs typeface="Arial"/>
-              </a:rPr>
-              <a:t>different</a:t>
-            </a:r>
-            <a:r>
-              <a:rPr lang="it-IT" dirty="0">
-                <a:latin typeface="Arial"/>
-                <a:cs typeface="Arial"/>
-              </a:rPr>
-              <a:t> K and N</a:t>
+              <a:t>Definition</a:t>
+            </a:r>
+          </a:p>
+        </p:txBody>
+      </p:sp>
+      <p:sp>
+        <p:nvSpPr>
+          <p:cNvPr id="9" name="CasellaDiTesto 8"/>
+          <p:cNvSpPr txBox="1"/>
+          <p:nvPr/>
+        </p:nvSpPr>
+        <p:spPr>
+          <a:xfrm>
+            <a:off x="648253" y="2378264"/>
+            <a:ext cx="7819027" cy="1169551"/>
+          </a:xfrm>
+          <a:prstGeom prst="rect">
+            <a:avLst/>
+          </a:prstGeom>
+          <a:noFill/>
+        </p:spPr>
+        <p:txBody>
+          <a:bodyPr wrap="square" rtlCol="0">
+            <a:spAutoFit/>
+          </a:bodyPr>
+          <a:lstStyle/>
+          <a:p>
+            <a:pPr algn="just"/>
+            <a:r>
+              <a:rPr lang="en-US" sz="1400" dirty="0"/>
+              <a:t>In order to compare the performance of a sequential algorithm with its parallel version we can use the concept of </a:t>
+            </a:r>
+            <a:r>
+              <a:rPr lang="en-US" sz="1400" b="1" dirty="0"/>
+              <a:t>speedup</a:t>
+            </a:r>
+            <a:r>
+              <a:rPr lang="en-US" sz="1400" dirty="0"/>
+              <a:t>.</a:t>
+            </a:r>
+          </a:p>
+          <a:p>
+            <a:pPr algn="just"/>
+            <a:endParaRPr lang="en-US" sz="1400" dirty="0"/>
+          </a:p>
+          <a:p>
+            <a:pPr algn="just"/>
+            <a:r>
+              <a:rPr lang="en-US" sz="1400" dirty="0"/>
+              <a:t>Speedup is measured as the ratio between the execution time of the sequential algorithm and the parallel one.</a:t>
             </a:r>
           </a:p>
         </p:txBody>
@@ -5879,10 +5991,10 @@
       </p:sp>
       <p:pic>
         <p:nvPicPr>
-          <p:cNvPr id="4" name="Immagine 3">
+          <p:cNvPr id="5" name="Immagine 4">
             <a:extLst>
               <a:ext uri="{FF2B5EF4-FFF2-40B4-BE49-F238E27FC236}">
-                <a16:creationId xmlns:a16="http://schemas.microsoft.com/office/drawing/2014/main" id="{1D04563C-2721-C818-B4E3-60C8E368D33F}"/>
+                <a16:creationId xmlns:a16="http://schemas.microsoft.com/office/drawing/2014/main" id="{50110DEC-1E9A-2C82-AA49-62E6374C5D9F}"/>
               </a:ext>
             </a:extLst>
           </p:cNvPr>
@@ -5899,48 +6011,70 @@
         </p:blipFill>
         <p:spPr>
           <a:xfrm>
-            <a:off x="648253" y="2344908"/>
-            <a:ext cx="3923747" cy="3318267"/>
+            <a:off x="4040484" y="3547815"/>
+            <a:ext cx="1099544" cy="1056842"/>
           </a:xfrm>
           <a:prstGeom prst="rect">
             <a:avLst/>
           </a:prstGeom>
         </p:spPr>
       </p:pic>
-      <p:pic>
-        <p:nvPicPr>
-          <p:cNvPr id="6" name="Immagine 5">
+      <p:sp>
+        <p:nvSpPr>
+          <p:cNvPr id="6" name="CasellaDiTesto 5">
             <a:extLst>
               <a:ext uri="{FF2B5EF4-FFF2-40B4-BE49-F238E27FC236}">
-                <a16:creationId xmlns:a16="http://schemas.microsoft.com/office/drawing/2014/main" id="{F680E661-EF7E-4438-4506-A2860D1ACC44}"/>
+                <a16:creationId xmlns:a16="http://schemas.microsoft.com/office/drawing/2014/main" id="{1ABFE85D-59C6-350B-0C36-765E48E99E35}"/>
               </a:ext>
             </a:extLst>
           </p:cNvPr>
-          <p:cNvPicPr>
-            <a:picLocks noChangeAspect="1"/>
-          </p:cNvPicPr>
+          <p:cNvSpPr txBox="1"/>
           <p:nvPr/>
-        </p:nvPicPr>
-        <p:blipFill>
-          <a:blip r:embed="rId5"/>
-          <a:stretch>
-            <a:fillRect/>
-          </a:stretch>
-        </p:blipFill>
-        <p:spPr>
-          <a:xfrm>
-            <a:off x="4440289" y="2344908"/>
-            <a:ext cx="3923747" cy="3241858"/>
+        </p:nvSpPr>
+        <p:spPr>
+          <a:xfrm>
+            <a:off x="648252" y="4768544"/>
+            <a:ext cx="7819027" cy="523220"/>
           </a:xfrm>
           <a:prstGeom prst="rect">
             <a:avLst/>
           </a:prstGeom>
-        </p:spPr>
-      </p:pic>
+          <a:noFill/>
+        </p:spPr>
+        <p:txBody>
+          <a:bodyPr wrap="square" rtlCol="0">
+            <a:spAutoFit/>
+          </a:bodyPr>
+          <a:lstStyle/>
+          <a:p>
+            <a:pPr algn="just"/>
+            <a:r>
+              <a:rPr lang="en-US" sz="1400" dirty="0"/>
+              <a:t>Ideally, we should look for </a:t>
+            </a:r>
+            <a:r>
+              <a:rPr lang="en-US" sz="1400" i="1" dirty="0"/>
+              <a:t>perfect speedup </a:t>
+            </a:r>
+            <a:r>
+              <a:rPr lang="en-US" sz="1400" dirty="0"/>
+              <a:t>or even </a:t>
+            </a:r>
+            <a:r>
+              <a:rPr lang="en-US" sz="1400" i="1" dirty="0"/>
+              <a:t>linear speedup</a:t>
+            </a:r>
+            <a:r>
+              <a:rPr lang="en-US" sz="1400" dirty="0"/>
+              <a:t>, meaning S should be equal or similar to the number of processors used to perform the parallel algorithm.</a:t>
+            </a:r>
+          </a:p>
+        </p:txBody>
+      </p:sp>
     </p:spTree>
     <p:extLst>
       <p:ext uri="{BB962C8B-B14F-4D97-AF65-F5344CB8AC3E}">
-        <p14:creationId xmlns:p14="http://schemas.microsoft.com/office/powerpoint/2010/main" val="3113929549"/>
+        <p14:creationId xmlns:p14="http://schemas.microsoft.com/office/powerpoint/2010/main" val="2140452309"/>
       </p:ext>
     </p:extLst>
   </p:cSld>
@@ -6049,7 +6183,7 @@
         <p:spPr>
           <a:xfrm>
             <a:off x="648253" y="1705113"/>
-            <a:ext cx="3095784" cy="369332"/>
+            <a:ext cx="4117474" cy="369332"/>
           </a:xfrm>
           <a:prstGeom prst="rect">
             <a:avLst/>
@@ -6067,28 +6201,42 @@
                 <a:latin typeface="Arial"/>
                 <a:cs typeface="Arial"/>
               </a:rPr>
-              <a:t>Example</a:t>
+              <a:t>Speedup</a:t>
             </a:r>
             <a:r>
               <a:rPr lang="it-IT" dirty="0">
                 <a:latin typeface="Arial"/>
                 <a:cs typeface="Arial"/>
               </a:rPr>
-              <a:t> of </a:t>
+              <a:t> </a:t>
             </a:r>
             <a:r>
               <a:rPr lang="it-IT" dirty="0" err="1">
                 <a:latin typeface="Arial"/>
                 <a:cs typeface="Arial"/>
               </a:rPr>
-              <a:t>Execution</a:t>
+              <a:t>results</a:t>
             </a:r>
             <a:r>
               <a:rPr lang="it-IT" dirty="0">
                 <a:latin typeface="Arial"/>
                 <a:cs typeface="Arial"/>
               </a:rPr>
-              <a:t> Times</a:t>
+              <a:t> with </a:t>
+            </a:r>
+            <a:r>
+              <a:rPr lang="it-IT" dirty="0" err="1">
+                <a:latin typeface="Arial"/>
+                <a:cs typeface="Arial"/>
+              </a:rPr>
+              <a:t>different</a:t>
+            </a:r>
+            <a:r>
+              <a:rPr lang="it-IT" dirty="0">
+                <a:latin typeface="Arial"/>
+                <a:cs typeface="Arial"/>
+              </a:rPr>
+              <a:t> K and N</a:t>
             </a:r>
           </a:p>
         </p:txBody>
@@ -6168,6 +6316,538 @@
               </a:rPr>
               <a:pPr/>
               <a:t>12</a:t>
+            </a:fld>
+            <a:endParaRPr lang="it-IT" b="1" dirty="0">
+              <a:solidFill>
+                <a:schemeClr val="bg1"/>
+              </a:solidFill>
+              <a:latin typeface="Arial"/>
+              <a:cs typeface="Arial"/>
+            </a:endParaRPr>
+          </a:p>
+        </p:txBody>
+      </p:sp>
+      <p:sp>
+        <p:nvSpPr>
+          <p:cNvPr id="10" name="CasellaDiTesto 9"/>
+          <p:cNvSpPr txBox="1"/>
+          <p:nvPr/>
+        </p:nvSpPr>
+        <p:spPr>
+          <a:xfrm>
+            <a:off x="5844955" y="51433"/>
+            <a:ext cx="2848858" cy="338554"/>
+          </a:xfrm>
+          <a:prstGeom prst="rect">
+            <a:avLst/>
+          </a:prstGeom>
+          <a:noFill/>
+        </p:spPr>
+        <p:txBody>
+          <a:bodyPr wrap="none" rtlCol="0">
+            <a:spAutoFit/>
+          </a:bodyPr>
+          <a:lstStyle/>
+          <a:p>
+            <a:pPr algn="r"/>
+            <a:r>
+              <a:rPr lang="it-IT" sz="800" b="1" dirty="0">
+                <a:solidFill>
+                  <a:schemeClr val="bg1"/>
+                </a:solidFill>
+                <a:latin typeface="Arial"/>
+                <a:cs typeface="Arial"/>
+              </a:rPr>
+              <a:t>K-Means Clustering</a:t>
+            </a:r>
+          </a:p>
+          <a:p>
+            <a:pPr algn="r"/>
+            <a:r>
+              <a:rPr lang="it-IT" sz="800" b="1" dirty="0" err="1">
+                <a:solidFill>
+                  <a:schemeClr val="bg1"/>
+                </a:solidFill>
+                <a:latin typeface="Arial"/>
+                <a:cs typeface="Arial"/>
+              </a:rPr>
+              <a:t>Comparison</a:t>
+            </a:r>
+            <a:r>
+              <a:rPr lang="it-IT" sz="800" b="1" dirty="0">
+                <a:solidFill>
+                  <a:schemeClr val="bg1"/>
+                </a:solidFill>
+                <a:latin typeface="Arial"/>
+                <a:cs typeface="Arial"/>
+              </a:rPr>
+              <a:t> </a:t>
+            </a:r>
+            <a:r>
+              <a:rPr lang="it-IT" sz="800" b="1" dirty="0" err="1">
+                <a:solidFill>
+                  <a:schemeClr val="bg1"/>
+                </a:solidFill>
+                <a:latin typeface="Arial"/>
+                <a:cs typeface="Arial"/>
+              </a:rPr>
+              <a:t>between</a:t>
+            </a:r>
+            <a:r>
+              <a:rPr lang="it-IT" sz="800" b="1" dirty="0">
+                <a:solidFill>
+                  <a:schemeClr val="bg1"/>
+                </a:solidFill>
+                <a:latin typeface="Arial"/>
+                <a:cs typeface="Arial"/>
+              </a:rPr>
+              <a:t> a </a:t>
+            </a:r>
+            <a:r>
+              <a:rPr lang="it-IT" sz="800" b="1" dirty="0" err="1">
+                <a:solidFill>
+                  <a:schemeClr val="bg1"/>
+                </a:solidFill>
+                <a:latin typeface="Arial"/>
+                <a:cs typeface="Arial"/>
+              </a:rPr>
+              <a:t>sequential</a:t>
+            </a:r>
+            <a:r>
+              <a:rPr lang="it-IT" sz="800" b="1" dirty="0">
+                <a:solidFill>
+                  <a:schemeClr val="bg1"/>
+                </a:solidFill>
+                <a:latin typeface="Arial"/>
+                <a:cs typeface="Arial"/>
+              </a:rPr>
+              <a:t> and </a:t>
+            </a:r>
+            <a:r>
+              <a:rPr lang="it-IT" sz="800" b="1" dirty="0" err="1">
+                <a:solidFill>
+                  <a:schemeClr val="bg1"/>
+                </a:solidFill>
+                <a:latin typeface="Arial"/>
+                <a:cs typeface="Arial"/>
+              </a:rPr>
+              <a:t>parallel</a:t>
+            </a:r>
+            <a:r>
+              <a:rPr lang="it-IT" sz="800" b="1" dirty="0">
+                <a:solidFill>
+                  <a:schemeClr val="bg1"/>
+                </a:solidFill>
+                <a:latin typeface="Arial"/>
+                <a:cs typeface="Arial"/>
+              </a:rPr>
+              <a:t> </a:t>
+            </a:r>
+            <a:r>
+              <a:rPr lang="it-IT" sz="800" b="1" dirty="0" err="1">
+                <a:solidFill>
+                  <a:schemeClr val="bg1"/>
+                </a:solidFill>
+                <a:latin typeface="Arial"/>
+                <a:cs typeface="Arial"/>
+              </a:rPr>
+              <a:t>version</a:t>
+            </a:r>
+            <a:endParaRPr lang="it-IT" sz="800" b="1" dirty="0">
+              <a:solidFill>
+                <a:schemeClr val="bg1"/>
+              </a:solidFill>
+              <a:latin typeface="Arial"/>
+              <a:cs typeface="Arial"/>
+            </a:endParaRPr>
+          </a:p>
+        </p:txBody>
+      </p:sp>
+      <p:sp>
+        <p:nvSpPr>
+          <p:cNvPr id="14" name="CasellaDiTesto 13"/>
+          <p:cNvSpPr txBox="1"/>
+          <p:nvPr/>
+        </p:nvSpPr>
+        <p:spPr>
+          <a:xfrm>
+            <a:off x="7082015" y="403482"/>
+            <a:ext cx="1621846" cy="492443"/>
+          </a:xfrm>
+          <a:prstGeom prst="rect">
+            <a:avLst/>
+          </a:prstGeom>
+          <a:noFill/>
+        </p:spPr>
+        <p:txBody>
+          <a:bodyPr wrap="none" rtlCol="0">
+            <a:spAutoFit/>
+          </a:bodyPr>
+          <a:lstStyle/>
+          <a:p>
+            <a:pPr algn="r"/>
+            <a:r>
+              <a:rPr lang="it-IT" sz="800" dirty="0">
+                <a:solidFill>
+                  <a:schemeClr val="bg1"/>
+                </a:solidFill>
+                <a:latin typeface="Arial"/>
+                <a:cs typeface="Arial"/>
+              </a:rPr>
+              <a:t>Firenze – 12/1/2023</a:t>
+            </a:r>
+          </a:p>
+          <a:p>
+            <a:endParaRPr lang="it-IT" dirty="0"/>
+          </a:p>
+        </p:txBody>
+      </p:sp>
+      <p:pic>
+        <p:nvPicPr>
+          <p:cNvPr id="4" name="Immagine 3">
+            <a:extLst>
+              <a:ext uri="{FF2B5EF4-FFF2-40B4-BE49-F238E27FC236}">
+                <a16:creationId xmlns:a16="http://schemas.microsoft.com/office/drawing/2014/main" id="{1D04563C-2721-C818-B4E3-60C8E368D33F}"/>
+              </a:ext>
+            </a:extLst>
+          </p:cNvPr>
+          <p:cNvPicPr>
+            <a:picLocks noChangeAspect="1"/>
+          </p:cNvPicPr>
+          <p:nvPr/>
+        </p:nvPicPr>
+        <p:blipFill>
+          <a:blip r:embed="rId4"/>
+          <a:stretch>
+            <a:fillRect/>
+          </a:stretch>
+        </p:blipFill>
+        <p:spPr>
+          <a:xfrm>
+            <a:off x="634019" y="3249406"/>
+            <a:ext cx="3923747" cy="3318267"/>
+          </a:xfrm>
+          <a:prstGeom prst="rect">
+            <a:avLst/>
+          </a:prstGeom>
+        </p:spPr>
+      </p:pic>
+      <p:pic>
+        <p:nvPicPr>
+          <p:cNvPr id="6" name="Immagine 5">
+            <a:extLst>
+              <a:ext uri="{FF2B5EF4-FFF2-40B4-BE49-F238E27FC236}">
+                <a16:creationId xmlns:a16="http://schemas.microsoft.com/office/drawing/2014/main" id="{F680E661-EF7E-4438-4506-A2860D1ACC44}"/>
+              </a:ext>
+            </a:extLst>
+          </p:cNvPr>
+          <p:cNvPicPr>
+            <a:picLocks noChangeAspect="1"/>
+          </p:cNvPicPr>
+          <p:nvPr/>
+        </p:nvPicPr>
+        <p:blipFill>
+          <a:blip r:embed="rId5"/>
+          <a:stretch>
+            <a:fillRect/>
+          </a:stretch>
+        </p:blipFill>
+        <p:spPr>
+          <a:xfrm>
+            <a:off x="4440289" y="3243182"/>
+            <a:ext cx="3923747" cy="3241858"/>
+          </a:xfrm>
+          <a:prstGeom prst="rect">
+            <a:avLst/>
+          </a:prstGeom>
+        </p:spPr>
+      </p:pic>
+      <p:sp>
+        <p:nvSpPr>
+          <p:cNvPr id="3" name="CasellaDiTesto 2">
+            <a:extLst>
+              <a:ext uri="{FF2B5EF4-FFF2-40B4-BE49-F238E27FC236}">
+                <a16:creationId xmlns:a16="http://schemas.microsoft.com/office/drawing/2014/main" id="{B95BC8D1-F5D2-3865-EF9B-C4FEEBA9C244}"/>
+              </a:ext>
+            </a:extLst>
+          </p:cNvPr>
+          <p:cNvSpPr txBox="1"/>
+          <p:nvPr/>
+        </p:nvSpPr>
+        <p:spPr>
+          <a:xfrm>
+            <a:off x="648253" y="2378264"/>
+            <a:ext cx="7819027" cy="954107"/>
+          </a:xfrm>
+          <a:prstGeom prst="rect">
+            <a:avLst/>
+          </a:prstGeom>
+          <a:noFill/>
+        </p:spPr>
+        <p:txBody>
+          <a:bodyPr wrap="square" rtlCol="0">
+            <a:spAutoFit/>
+          </a:bodyPr>
+          <a:lstStyle/>
+          <a:p>
+            <a:pPr algn="just"/>
+            <a:r>
+              <a:rPr lang="en-US" sz="1400" dirty="0"/>
+              <a:t>The experiments were performed on a Intel Core i7-1165G7 with 8 logical cores.</a:t>
+            </a:r>
+          </a:p>
+          <a:p>
+            <a:pPr algn="just"/>
+            <a:endParaRPr lang="en-US" sz="1400" dirty="0"/>
+          </a:p>
+          <a:p>
+            <a:pPr algn="just"/>
+            <a:r>
+              <a:rPr lang="en-US" sz="1400" dirty="0"/>
+              <a:t>Since the algorithm has the hyperparameter K for the number of clusters, different experiments were performed with varying K and fixed N (number of points), and </a:t>
+            </a:r>
+            <a:r>
+              <a:rPr lang="en-US" sz="1400" dirty="0" err="1"/>
+              <a:t>viceversa</a:t>
+            </a:r>
+            <a:r>
+              <a:rPr lang="en-US" sz="1400" dirty="0"/>
+              <a:t>.</a:t>
+            </a:r>
+          </a:p>
+        </p:txBody>
+      </p:sp>
+    </p:spTree>
+    <p:extLst>
+      <p:ext uri="{BB962C8B-B14F-4D97-AF65-F5344CB8AC3E}">
+        <p14:creationId xmlns:p14="http://schemas.microsoft.com/office/powerpoint/2010/main" val="3113929549"/>
+      </p:ext>
+    </p:extLst>
+  </p:cSld>
+  <p:clrMapOvr>
+    <a:masterClrMapping/>
+  </p:clrMapOvr>
+</p:sld>
+</file>
+
+<file path=ppt/slides/slide13.xml><?xml version="1.0" encoding="utf-8"?>
+<p:sld xmlns:a="http://schemas.openxmlformats.org/drawingml/2006/main" xmlns:r="http://schemas.openxmlformats.org/officeDocument/2006/relationships" xmlns:p="http://schemas.openxmlformats.org/presentationml/2006/main">
+  <p:cSld>
+    <p:spTree>
+      <p:nvGrpSpPr>
+        <p:cNvPr id="1" name=""/>
+        <p:cNvGrpSpPr/>
+        <p:nvPr/>
+      </p:nvGrpSpPr>
+      <p:grpSpPr>
+        <a:xfrm>
+          <a:off x="0" y="0"/>
+          <a:ext cx="0" cy="0"/>
+          <a:chOff x="0" y="0"/>
+          <a:chExt cx="0" cy="0"/>
+        </a:xfrm>
+      </p:grpSpPr>
+      <p:pic>
+        <p:nvPicPr>
+          <p:cNvPr id="2" name="Immagine 1"/>
+          <p:cNvPicPr>
+            <a:picLocks noChangeAspect="1"/>
+          </p:cNvPicPr>
+          <p:nvPr/>
+        </p:nvPicPr>
+        <p:blipFill>
+          <a:blip r:embed="rId3"/>
+          <a:stretch>
+            <a:fillRect/>
+          </a:stretch>
+        </p:blipFill>
+        <p:spPr>
+          <a:xfrm>
+            <a:off x="0" y="1707"/>
+            <a:ext cx="9180512" cy="6872633"/>
+          </a:xfrm>
+          <a:prstGeom prst="rect">
+            <a:avLst/>
+          </a:prstGeom>
+        </p:spPr>
+      </p:pic>
+      <p:sp>
+        <p:nvSpPr>
+          <p:cNvPr id="7" name="CasellaDiTesto 6"/>
+          <p:cNvSpPr txBox="1"/>
+          <p:nvPr/>
+        </p:nvSpPr>
+        <p:spPr>
+          <a:xfrm>
+            <a:off x="648253" y="1305402"/>
+            <a:ext cx="5196702" cy="461665"/>
+          </a:xfrm>
+          <a:prstGeom prst="rect">
+            <a:avLst/>
+          </a:prstGeom>
+          <a:noFill/>
+        </p:spPr>
+        <p:txBody>
+          <a:bodyPr wrap="square" rtlCol="0">
+            <a:spAutoFit/>
+          </a:bodyPr>
+          <a:lstStyle/>
+          <a:p>
+            <a:r>
+              <a:rPr lang="it-IT" sz="2400" b="1" dirty="0" err="1">
+                <a:solidFill>
+                  <a:schemeClr val="accent1">
+                    <a:lumMod val="75000"/>
+                  </a:schemeClr>
+                </a:solidFill>
+                <a:latin typeface="Arial"/>
+                <a:cs typeface="Arial"/>
+              </a:rPr>
+              <a:t>Speedup</a:t>
+            </a:r>
+            <a:r>
+              <a:rPr lang="it-IT" sz="2400" b="1" dirty="0">
+                <a:solidFill>
+                  <a:schemeClr val="accent1">
+                    <a:lumMod val="75000"/>
+                  </a:schemeClr>
+                </a:solidFill>
+                <a:latin typeface="Arial"/>
+                <a:cs typeface="Arial"/>
+              </a:rPr>
+              <a:t> Analysis</a:t>
+            </a:r>
+          </a:p>
+        </p:txBody>
+      </p:sp>
+      <p:sp>
+        <p:nvSpPr>
+          <p:cNvPr id="8" name="CasellaDiTesto 7"/>
+          <p:cNvSpPr txBox="1"/>
+          <p:nvPr/>
+        </p:nvSpPr>
+        <p:spPr>
+          <a:xfrm>
+            <a:off x="648253" y="1705113"/>
+            <a:ext cx="3095784" cy="369332"/>
+          </a:xfrm>
+          <a:prstGeom prst="rect">
+            <a:avLst/>
+          </a:prstGeom>
+          <a:noFill/>
+        </p:spPr>
+        <p:txBody>
+          <a:bodyPr wrap="none" rtlCol="0">
+            <a:spAutoFit/>
+          </a:bodyPr>
+          <a:lstStyle/>
+          <a:p>
+            <a:r>
+              <a:rPr lang="it-IT" dirty="0" err="1">
+                <a:latin typeface="Arial"/>
+                <a:cs typeface="Arial"/>
+              </a:rPr>
+              <a:t>Example</a:t>
+            </a:r>
+            <a:r>
+              <a:rPr lang="it-IT" dirty="0">
+                <a:latin typeface="Arial"/>
+                <a:cs typeface="Arial"/>
+              </a:rPr>
+              <a:t> of </a:t>
+            </a:r>
+            <a:r>
+              <a:rPr lang="it-IT" dirty="0" err="1">
+                <a:latin typeface="Arial"/>
+                <a:cs typeface="Arial"/>
+              </a:rPr>
+              <a:t>Execution</a:t>
+            </a:r>
+            <a:r>
+              <a:rPr lang="it-IT" dirty="0">
+                <a:latin typeface="Arial"/>
+                <a:cs typeface="Arial"/>
+              </a:rPr>
+              <a:t> Times</a:t>
+            </a:r>
+          </a:p>
+        </p:txBody>
+      </p:sp>
+      <p:sp>
+        <p:nvSpPr>
+          <p:cNvPr id="12" name="Rettangolo 11"/>
+          <p:cNvSpPr/>
+          <p:nvPr/>
+        </p:nvSpPr>
+        <p:spPr>
+          <a:xfrm>
+            <a:off x="8255000" y="6366466"/>
+            <a:ext cx="280763" cy="501650"/>
+          </a:xfrm>
+          <a:prstGeom prst="rect">
+            <a:avLst/>
+          </a:prstGeom>
+          <a:solidFill>
+            <a:srgbClr val="003053"/>
+          </a:solidFill>
+        </p:spPr>
+        <p:style>
+          <a:lnRef idx="1">
+            <a:schemeClr val="accent1"/>
+          </a:lnRef>
+          <a:fillRef idx="3">
+            <a:schemeClr val="accent1"/>
+          </a:fillRef>
+          <a:effectRef idx="2">
+            <a:schemeClr val="accent1"/>
+          </a:effectRef>
+          <a:fontRef idx="minor">
+            <a:schemeClr val="lt1"/>
+          </a:fontRef>
+        </p:style>
+        <p:txBody>
+          <a:bodyPr rtlCol="0" anchor="ctr"/>
+          <a:lstStyle/>
+          <a:p>
+            <a:pPr algn="ctr"/>
+            <a:endParaRPr lang="it-IT">
+              <a:solidFill>
+                <a:srgbClr val="003257"/>
+              </a:solidFill>
+            </a:endParaRPr>
+          </a:p>
+        </p:txBody>
+      </p:sp>
+      <p:sp>
+        <p:nvSpPr>
+          <p:cNvPr id="11" name="Segnaposto numero diapositiva 10"/>
+          <p:cNvSpPr>
+            <a:spLocks noGrp="1"/>
+          </p:cNvSpPr>
+          <p:nvPr>
+            <p:ph type="sldNum" sz="quarter" idx="12"/>
+          </p:nvPr>
+        </p:nvSpPr>
+        <p:spPr>
+          <a:xfrm>
+            <a:off x="6402163" y="6356350"/>
+            <a:ext cx="2133600" cy="365125"/>
+          </a:xfrm>
+        </p:spPr>
+        <p:txBody>
+          <a:bodyPr/>
+          <a:lstStyle/>
+          <a:p>
+            <a:fld id="{8EB8520A-26EA-DE4B-B141-4532FC98FF0E}" type="slidenum">
+              <a:rPr lang="it-IT" b="1" smtClean="0">
+                <a:solidFill>
+                  <a:schemeClr val="bg1"/>
+                </a:solidFill>
+                <a:latin typeface="Arial"/>
+                <a:cs typeface="Arial"/>
+              </a:rPr>
+              <a:pPr/>
+              <a:t>13</a:t>
             </a:fld>
             <a:endParaRPr lang="it-IT" b="1" dirty="0">
               <a:solidFill>
@@ -6376,8 +7056,38 @@
         </p:blipFill>
         <p:spPr>
           <a:xfrm>
-            <a:off x="2587523" y="2863361"/>
+            <a:off x="621302" y="2961333"/>
             <a:ext cx="3968954" cy="2000353"/>
+          </a:xfrm>
+          <a:prstGeom prst="rect">
+            <a:avLst/>
+          </a:prstGeom>
+        </p:spPr>
+      </p:pic>
+      <p:pic>
+        <p:nvPicPr>
+          <p:cNvPr id="4" name="Immagine 3" descr="Immagine che contiene tavolo&#10;&#10;Descrizione generata automaticamente">
+            <a:extLst>
+              <a:ext uri="{FF2B5EF4-FFF2-40B4-BE49-F238E27FC236}">
+                <a16:creationId xmlns:a16="http://schemas.microsoft.com/office/drawing/2014/main" id="{5D728585-4525-A136-6AEE-6EEBD3093444}"/>
+              </a:ext>
+            </a:extLst>
+          </p:cNvPr>
+          <p:cNvPicPr>
+            <a:picLocks noChangeAspect="1"/>
+          </p:cNvPicPr>
+          <p:nvPr/>
+        </p:nvPicPr>
+        <p:blipFill>
+          <a:blip r:embed="rId5"/>
+          <a:stretch>
+            <a:fillRect/>
+          </a:stretch>
+        </p:blipFill>
+        <p:spPr>
+          <a:xfrm>
+            <a:off x="4734468" y="3070763"/>
+            <a:ext cx="3788230" cy="1851482"/>
           </a:xfrm>
           <a:prstGeom prst="rect">
             <a:avLst/>

</xml_diff>

<commit_message>
added tables for k
</commit_message>
<xml_diff>
--- a/presentation/KMeansClustering.pptx
+++ b/presentation/KMeansClustering.pptx
@@ -6729,7 +6729,7 @@
         <p:spPr>
           <a:xfrm>
             <a:off x="648253" y="1705113"/>
-            <a:ext cx="3095784" cy="369332"/>
+            <a:ext cx="1877502" cy="369332"/>
           </a:xfrm>
           <a:prstGeom prst="rect">
             <a:avLst/>
@@ -6742,20 +6742,6 @@
           </a:bodyPr>
           <a:lstStyle/>
           <a:p>
-            <a:r>
-              <a:rPr lang="it-IT" dirty="0" err="1">
-                <a:latin typeface="Arial"/>
-                <a:cs typeface="Arial"/>
-              </a:rPr>
-              <a:t>Example</a:t>
-            </a:r>
-            <a:r>
-              <a:rPr lang="it-IT" dirty="0">
-                <a:latin typeface="Arial"/>
-                <a:cs typeface="Arial"/>
-              </a:rPr>
-              <a:t> of </a:t>
-            </a:r>
             <a:r>
               <a:rPr lang="it-IT" dirty="0" err="1">
                 <a:latin typeface="Arial"/>
@@ -7036,10 +7022,10 @@
       </p:sp>
       <p:pic>
         <p:nvPicPr>
-          <p:cNvPr id="5" name="Immagine 4" descr="Immagine che contiene tavolo&#10;&#10;Descrizione generata automaticamente">
+          <p:cNvPr id="6" name="Immagine 5" descr="Immagine che contiene tavolo&#10;&#10;Descrizione generata automaticamente">
             <a:extLst>
               <a:ext uri="{FF2B5EF4-FFF2-40B4-BE49-F238E27FC236}">
-                <a16:creationId xmlns:a16="http://schemas.microsoft.com/office/drawing/2014/main" id="{C43639AD-90D5-9A8B-5DFF-8A54F5AB7578}"/>
+                <a16:creationId xmlns:a16="http://schemas.microsoft.com/office/drawing/2014/main" id="{4DB12F80-CA2D-E023-C8A8-EE3698BA999D}"/>
               </a:ext>
             </a:extLst>
           </p:cNvPr>
@@ -7056,8 +7042,8 @@
         </p:blipFill>
         <p:spPr>
           <a:xfrm>
-            <a:off x="621302" y="2961333"/>
-            <a:ext cx="3968954" cy="2000353"/>
+            <a:off x="639023" y="2204763"/>
+            <a:ext cx="3924502" cy="1962251"/>
           </a:xfrm>
           <a:prstGeom prst="rect">
             <a:avLst/>
@@ -7066,10 +7052,10 @@
       </p:pic>
       <p:pic>
         <p:nvPicPr>
-          <p:cNvPr id="4" name="Immagine 3" descr="Immagine che contiene tavolo&#10;&#10;Descrizione generata automaticamente">
+          <p:cNvPr id="13" name="Immagine 12" descr="Immagine che contiene tavolo&#10;&#10;Descrizione generata automaticamente">
             <a:extLst>
               <a:ext uri="{FF2B5EF4-FFF2-40B4-BE49-F238E27FC236}">
-                <a16:creationId xmlns:a16="http://schemas.microsoft.com/office/drawing/2014/main" id="{5D728585-4525-A136-6AEE-6EEBD3093444}"/>
+                <a16:creationId xmlns:a16="http://schemas.microsoft.com/office/drawing/2014/main" id="{A18DC522-B298-0D9B-83EF-92EA2F84046C}"/>
               </a:ext>
             </a:extLst>
           </p:cNvPr>
@@ -7086,8 +7072,68 @@
         </p:blipFill>
         <p:spPr>
           <a:xfrm>
-            <a:off x="4734468" y="3070763"/>
-            <a:ext cx="3788230" cy="1851482"/>
+            <a:off x="4847173" y="2248124"/>
+            <a:ext cx="3962604" cy="1949550"/>
+          </a:xfrm>
+          <a:prstGeom prst="rect">
+            <a:avLst/>
+          </a:prstGeom>
+        </p:spPr>
+      </p:pic>
+      <p:pic>
+        <p:nvPicPr>
+          <p:cNvPr id="16" name="Immagine 15" descr="Immagine che contiene tavolo&#10;&#10;Descrizione generata automaticamente">
+            <a:extLst>
+              <a:ext uri="{FF2B5EF4-FFF2-40B4-BE49-F238E27FC236}">
+                <a16:creationId xmlns:a16="http://schemas.microsoft.com/office/drawing/2014/main" id="{CFBD7350-78B3-E28B-1F38-9CAD84EA54F1}"/>
+              </a:ext>
+            </a:extLst>
+          </p:cNvPr>
+          <p:cNvPicPr>
+            <a:picLocks noChangeAspect="1"/>
+          </p:cNvPicPr>
+          <p:nvPr/>
+        </p:nvPicPr>
+        <p:blipFill>
+          <a:blip r:embed="rId6"/>
+          <a:stretch>
+            <a:fillRect/>
+          </a:stretch>
+        </p:blipFill>
+        <p:spPr>
+          <a:xfrm>
+            <a:off x="639023" y="4387749"/>
+            <a:ext cx="4038808" cy="1968601"/>
+          </a:xfrm>
+          <a:prstGeom prst="rect">
+            <a:avLst/>
+          </a:prstGeom>
+        </p:spPr>
+      </p:pic>
+      <p:pic>
+        <p:nvPicPr>
+          <p:cNvPr id="18" name="Immagine 17" descr="Immagine che contiene tavolo&#10;&#10;Descrizione generata automaticamente">
+            <a:extLst>
+              <a:ext uri="{FF2B5EF4-FFF2-40B4-BE49-F238E27FC236}">
+                <a16:creationId xmlns:a16="http://schemas.microsoft.com/office/drawing/2014/main" id="{662FFCF0-B01E-11C9-5D1E-EDFDD4532897}"/>
+              </a:ext>
+            </a:extLst>
+          </p:cNvPr>
+          <p:cNvPicPr>
+            <a:picLocks noChangeAspect="1"/>
+          </p:cNvPicPr>
+          <p:nvPr/>
+        </p:nvPicPr>
+        <p:blipFill>
+          <a:blip r:embed="rId7"/>
+          <a:stretch>
+            <a:fillRect/>
+          </a:stretch>
+        </p:blipFill>
+        <p:spPr>
+          <a:xfrm>
+            <a:off x="4805896" y="4389704"/>
+            <a:ext cx="4045158" cy="1949550"/>
           </a:xfrm>
           <a:prstGeom prst="rect">
             <a:avLst/>

</xml_diff>

<commit_message>
added tables for n
</commit_message>
<xml_diff>
--- a/presentation/KMeansClustering.pptx
+++ b/presentation/KMeansClustering.pptx
@@ -5,10 +5,10 @@
     <p:sldMasterId id="2147483648" r:id="rId1"/>
   </p:sldMasterIdLst>
   <p:notesMasterIdLst>
-    <p:notesMasterId r:id="rId15"/>
+    <p:notesMasterId r:id="rId16"/>
   </p:notesMasterIdLst>
   <p:handoutMasterIdLst>
-    <p:handoutMasterId r:id="rId16"/>
+    <p:handoutMasterId r:id="rId17"/>
   </p:handoutMasterIdLst>
   <p:sldIdLst>
     <p:sldId id="256" r:id="rId2"/>
@@ -24,6 +24,7 @@
     <p:sldId id="269" r:id="rId12"/>
     <p:sldId id="267" r:id="rId13"/>
     <p:sldId id="268" r:id="rId14"/>
+    <p:sldId id="270" r:id="rId15"/>
   </p:sldIdLst>
   <p:sldSz cx="9144000" cy="6858000" type="screen4x3"/>
   <p:notesSz cx="6858000" cy="9144000"/>
@@ -144,6 +145,7 @@
             <p14:sldId id="269"/>
             <p14:sldId id="267"/>
             <p14:sldId id="268"/>
+            <p14:sldId id="270"/>
           </p14:sldIdLst>
         </p14:section>
       </p14:sectionLst>
@@ -1017,6 +1019,91 @@
     <p:extLst>
       <p:ext uri="{BB962C8B-B14F-4D97-AF65-F5344CB8AC3E}">
         <p14:creationId xmlns:p14="http://schemas.microsoft.com/office/powerpoint/2010/main" val="4123982893"/>
+      </p:ext>
+    </p:extLst>
+  </p:cSld>
+  <p:clrMapOvr>
+    <a:masterClrMapping/>
+  </p:clrMapOvr>
+</p:notes>
+</file>
+
+<file path=ppt/notesSlides/notesSlide13.xml><?xml version="1.0" encoding="utf-8"?>
+<p:notes xmlns:a="http://schemas.openxmlformats.org/drawingml/2006/main" xmlns:r="http://schemas.openxmlformats.org/officeDocument/2006/relationships" xmlns:p="http://schemas.openxmlformats.org/presentationml/2006/main">
+  <p:cSld>
+    <p:spTree>
+      <p:nvGrpSpPr>
+        <p:cNvPr id="1" name=""/>
+        <p:cNvGrpSpPr/>
+        <p:nvPr/>
+      </p:nvGrpSpPr>
+      <p:grpSpPr>
+        <a:xfrm>
+          <a:off x="0" y="0"/>
+          <a:ext cx="0" cy="0"/>
+          <a:chOff x="0" y="0"/>
+          <a:chExt cx="0" cy="0"/>
+        </a:xfrm>
+      </p:grpSpPr>
+      <p:sp>
+        <p:nvSpPr>
+          <p:cNvPr id="2" name="Segnaposto immagine diapositiva 1"/>
+          <p:cNvSpPr>
+            <a:spLocks noGrp="1" noRot="1" noChangeAspect="1"/>
+          </p:cNvSpPr>
+          <p:nvPr>
+            <p:ph type="sldImg"/>
+          </p:nvPr>
+        </p:nvSpPr>
+        <p:spPr/>
+      </p:sp>
+      <p:sp>
+        <p:nvSpPr>
+          <p:cNvPr id="3" name="Segnaposto note 2"/>
+          <p:cNvSpPr>
+            <a:spLocks noGrp="1"/>
+          </p:cNvSpPr>
+          <p:nvPr>
+            <p:ph type="body" idx="1"/>
+          </p:nvPr>
+        </p:nvSpPr>
+        <p:spPr/>
+        <p:txBody>
+          <a:bodyPr/>
+          <a:lstStyle/>
+          <a:p>
+            <a:endParaRPr lang="it-IT"/>
+          </a:p>
+        </p:txBody>
+      </p:sp>
+      <p:sp>
+        <p:nvSpPr>
+          <p:cNvPr id="4" name="Segnaposto numero diapositiva 3"/>
+          <p:cNvSpPr>
+            <a:spLocks noGrp="1"/>
+          </p:cNvSpPr>
+          <p:nvPr>
+            <p:ph type="sldNum" sz="quarter" idx="10"/>
+          </p:nvPr>
+        </p:nvSpPr>
+        <p:spPr/>
+        <p:txBody>
+          <a:bodyPr/>
+          <a:lstStyle/>
+          <a:p>
+            <a:fld id="{96986711-015B-0142-88C4-65D50E44FA77}" type="slidenum">
+              <a:rPr lang="it-IT" smtClean="0"/>
+              <a:pPr/>
+              <a:t>14</a:t>
+            </a:fld>
+            <a:endParaRPr lang="it-IT"/>
+          </a:p>
+        </p:txBody>
+      </p:sp>
+    </p:spTree>
+    <p:extLst>
+      <p:ext uri="{BB962C8B-B14F-4D97-AF65-F5344CB8AC3E}">
+        <p14:creationId xmlns:p14="http://schemas.microsoft.com/office/powerpoint/2010/main" val="1140228545"/>
       </p:ext>
     </p:extLst>
   </p:cSld>
@@ -7144,6 +7231,529 @@
     <p:extLst>
       <p:ext uri="{BB962C8B-B14F-4D97-AF65-F5344CB8AC3E}">
         <p14:creationId xmlns:p14="http://schemas.microsoft.com/office/powerpoint/2010/main" val="3526100407"/>
+      </p:ext>
+    </p:extLst>
+  </p:cSld>
+  <p:clrMapOvr>
+    <a:masterClrMapping/>
+  </p:clrMapOvr>
+</p:sld>
+</file>
+
+<file path=ppt/slides/slide14.xml><?xml version="1.0" encoding="utf-8"?>
+<p:sld xmlns:a="http://schemas.openxmlformats.org/drawingml/2006/main" xmlns:r="http://schemas.openxmlformats.org/officeDocument/2006/relationships" xmlns:p="http://schemas.openxmlformats.org/presentationml/2006/main">
+  <p:cSld>
+    <p:spTree>
+      <p:nvGrpSpPr>
+        <p:cNvPr id="1" name=""/>
+        <p:cNvGrpSpPr/>
+        <p:nvPr/>
+      </p:nvGrpSpPr>
+      <p:grpSpPr>
+        <a:xfrm>
+          <a:off x="0" y="0"/>
+          <a:ext cx="0" cy="0"/>
+          <a:chOff x="0" y="0"/>
+          <a:chExt cx="0" cy="0"/>
+        </a:xfrm>
+      </p:grpSpPr>
+      <p:pic>
+        <p:nvPicPr>
+          <p:cNvPr id="2" name="Immagine 1"/>
+          <p:cNvPicPr>
+            <a:picLocks noChangeAspect="1"/>
+          </p:cNvPicPr>
+          <p:nvPr/>
+        </p:nvPicPr>
+        <p:blipFill>
+          <a:blip r:embed="rId3"/>
+          <a:stretch>
+            <a:fillRect/>
+          </a:stretch>
+        </p:blipFill>
+        <p:spPr>
+          <a:xfrm>
+            <a:off x="0" y="1707"/>
+            <a:ext cx="9180512" cy="6872633"/>
+          </a:xfrm>
+          <a:prstGeom prst="rect">
+            <a:avLst/>
+          </a:prstGeom>
+        </p:spPr>
+      </p:pic>
+      <p:sp>
+        <p:nvSpPr>
+          <p:cNvPr id="7" name="CasellaDiTesto 6"/>
+          <p:cNvSpPr txBox="1"/>
+          <p:nvPr/>
+        </p:nvSpPr>
+        <p:spPr>
+          <a:xfrm>
+            <a:off x="648253" y="1305402"/>
+            <a:ext cx="5196702" cy="461665"/>
+          </a:xfrm>
+          <a:prstGeom prst="rect">
+            <a:avLst/>
+          </a:prstGeom>
+          <a:noFill/>
+        </p:spPr>
+        <p:txBody>
+          <a:bodyPr wrap="square" rtlCol="0">
+            <a:spAutoFit/>
+          </a:bodyPr>
+          <a:lstStyle/>
+          <a:p>
+            <a:r>
+              <a:rPr lang="it-IT" sz="2400" b="1" dirty="0" err="1">
+                <a:solidFill>
+                  <a:schemeClr val="accent1">
+                    <a:lumMod val="75000"/>
+                  </a:schemeClr>
+                </a:solidFill>
+                <a:latin typeface="Arial"/>
+                <a:cs typeface="Arial"/>
+              </a:rPr>
+              <a:t>Speedup</a:t>
+            </a:r>
+            <a:r>
+              <a:rPr lang="it-IT" sz="2400" b="1" dirty="0">
+                <a:solidFill>
+                  <a:schemeClr val="accent1">
+                    <a:lumMod val="75000"/>
+                  </a:schemeClr>
+                </a:solidFill>
+                <a:latin typeface="Arial"/>
+                <a:cs typeface="Arial"/>
+              </a:rPr>
+              <a:t> Analysis</a:t>
+            </a:r>
+          </a:p>
+        </p:txBody>
+      </p:sp>
+      <p:sp>
+        <p:nvSpPr>
+          <p:cNvPr id="8" name="CasellaDiTesto 7"/>
+          <p:cNvSpPr txBox="1"/>
+          <p:nvPr/>
+        </p:nvSpPr>
+        <p:spPr>
+          <a:xfrm>
+            <a:off x="648253" y="1705113"/>
+            <a:ext cx="1877502" cy="369332"/>
+          </a:xfrm>
+          <a:prstGeom prst="rect">
+            <a:avLst/>
+          </a:prstGeom>
+          <a:noFill/>
+        </p:spPr>
+        <p:txBody>
+          <a:bodyPr wrap="none" rtlCol="0">
+            <a:spAutoFit/>
+          </a:bodyPr>
+          <a:lstStyle/>
+          <a:p>
+            <a:r>
+              <a:rPr lang="it-IT" dirty="0" err="1">
+                <a:latin typeface="Arial"/>
+                <a:cs typeface="Arial"/>
+              </a:rPr>
+              <a:t>Execution</a:t>
+            </a:r>
+            <a:r>
+              <a:rPr lang="it-IT" dirty="0">
+                <a:latin typeface="Arial"/>
+                <a:cs typeface="Arial"/>
+              </a:rPr>
+              <a:t> Times</a:t>
+            </a:r>
+          </a:p>
+        </p:txBody>
+      </p:sp>
+      <p:sp>
+        <p:nvSpPr>
+          <p:cNvPr id="12" name="Rettangolo 11"/>
+          <p:cNvSpPr/>
+          <p:nvPr/>
+        </p:nvSpPr>
+        <p:spPr>
+          <a:xfrm>
+            <a:off x="8255000" y="6366466"/>
+            <a:ext cx="280763" cy="501650"/>
+          </a:xfrm>
+          <a:prstGeom prst="rect">
+            <a:avLst/>
+          </a:prstGeom>
+          <a:solidFill>
+            <a:srgbClr val="003053"/>
+          </a:solidFill>
+        </p:spPr>
+        <p:style>
+          <a:lnRef idx="1">
+            <a:schemeClr val="accent1"/>
+          </a:lnRef>
+          <a:fillRef idx="3">
+            <a:schemeClr val="accent1"/>
+          </a:fillRef>
+          <a:effectRef idx="2">
+            <a:schemeClr val="accent1"/>
+          </a:effectRef>
+          <a:fontRef idx="minor">
+            <a:schemeClr val="lt1"/>
+          </a:fontRef>
+        </p:style>
+        <p:txBody>
+          <a:bodyPr rtlCol="0" anchor="ctr"/>
+          <a:lstStyle/>
+          <a:p>
+            <a:pPr algn="ctr"/>
+            <a:endParaRPr lang="it-IT">
+              <a:solidFill>
+                <a:srgbClr val="003257"/>
+              </a:solidFill>
+            </a:endParaRPr>
+          </a:p>
+        </p:txBody>
+      </p:sp>
+      <p:sp>
+        <p:nvSpPr>
+          <p:cNvPr id="11" name="Segnaposto numero diapositiva 10"/>
+          <p:cNvSpPr>
+            <a:spLocks noGrp="1"/>
+          </p:cNvSpPr>
+          <p:nvPr>
+            <p:ph type="sldNum" sz="quarter" idx="12"/>
+          </p:nvPr>
+        </p:nvSpPr>
+        <p:spPr>
+          <a:xfrm>
+            <a:off x="6402163" y="6356350"/>
+            <a:ext cx="2133600" cy="365125"/>
+          </a:xfrm>
+        </p:spPr>
+        <p:txBody>
+          <a:bodyPr/>
+          <a:lstStyle/>
+          <a:p>
+            <a:fld id="{8EB8520A-26EA-DE4B-B141-4532FC98FF0E}" type="slidenum">
+              <a:rPr lang="it-IT" b="1" smtClean="0">
+                <a:solidFill>
+                  <a:schemeClr val="bg1"/>
+                </a:solidFill>
+                <a:latin typeface="Arial"/>
+                <a:cs typeface="Arial"/>
+              </a:rPr>
+              <a:pPr/>
+              <a:t>14</a:t>
+            </a:fld>
+            <a:endParaRPr lang="it-IT" b="1" dirty="0">
+              <a:solidFill>
+                <a:schemeClr val="bg1"/>
+              </a:solidFill>
+              <a:latin typeface="Arial"/>
+              <a:cs typeface="Arial"/>
+            </a:endParaRPr>
+          </a:p>
+        </p:txBody>
+      </p:sp>
+      <p:sp>
+        <p:nvSpPr>
+          <p:cNvPr id="10" name="CasellaDiTesto 9"/>
+          <p:cNvSpPr txBox="1"/>
+          <p:nvPr/>
+        </p:nvSpPr>
+        <p:spPr>
+          <a:xfrm>
+            <a:off x="5844955" y="51433"/>
+            <a:ext cx="2848858" cy="338554"/>
+          </a:xfrm>
+          <a:prstGeom prst="rect">
+            <a:avLst/>
+          </a:prstGeom>
+          <a:noFill/>
+        </p:spPr>
+        <p:txBody>
+          <a:bodyPr wrap="none" rtlCol="0">
+            <a:spAutoFit/>
+          </a:bodyPr>
+          <a:lstStyle/>
+          <a:p>
+            <a:pPr algn="r"/>
+            <a:r>
+              <a:rPr lang="it-IT" sz="800" b="1" dirty="0">
+                <a:solidFill>
+                  <a:schemeClr val="bg1"/>
+                </a:solidFill>
+                <a:latin typeface="Arial"/>
+                <a:cs typeface="Arial"/>
+              </a:rPr>
+              <a:t>K-Means Clustering</a:t>
+            </a:r>
+          </a:p>
+          <a:p>
+            <a:pPr algn="r"/>
+            <a:r>
+              <a:rPr lang="it-IT" sz="800" b="1" dirty="0" err="1">
+                <a:solidFill>
+                  <a:schemeClr val="bg1"/>
+                </a:solidFill>
+                <a:latin typeface="Arial"/>
+                <a:cs typeface="Arial"/>
+              </a:rPr>
+              <a:t>Comparison</a:t>
+            </a:r>
+            <a:r>
+              <a:rPr lang="it-IT" sz="800" b="1" dirty="0">
+                <a:solidFill>
+                  <a:schemeClr val="bg1"/>
+                </a:solidFill>
+                <a:latin typeface="Arial"/>
+                <a:cs typeface="Arial"/>
+              </a:rPr>
+              <a:t> </a:t>
+            </a:r>
+            <a:r>
+              <a:rPr lang="it-IT" sz="800" b="1" dirty="0" err="1">
+                <a:solidFill>
+                  <a:schemeClr val="bg1"/>
+                </a:solidFill>
+                <a:latin typeface="Arial"/>
+                <a:cs typeface="Arial"/>
+              </a:rPr>
+              <a:t>between</a:t>
+            </a:r>
+            <a:r>
+              <a:rPr lang="it-IT" sz="800" b="1" dirty="0">
+                <a:solidFill>
+                  <a:schemeClr val="bg1"/>
+                </a:solidFill>
+                <a:latin typeface="Arial"/>
+                <a:cs typeface="Arial"/>
+              </a:rPr>
+              <a:t> a </a:t>
+            </a:r>
+            <a:r>
+              <a:rPr lang="it-IT" sz="800" b="1" dirty="0" err="1">
+                <a:solidFill>
+                  <a:schemeClr val="bg1"/>
+                </a:solidFill>
+                <a:latin typeface="Arial"/>
+                <a:cs typeface="Arial"/>
+              </a:rPr>
+              <a:t>sequential</a:t>
+            </a:r>
+            <a:r>
+              <a:rPr lang="it-IT" sz="800" b="1" dirty="0">
+                <a:solidFill>
+                  <a:schemeClr val="bg1"/>
+                </a:solidFill>
+                <a:latin typeface="Arial"/>
+                <a:cs typeface="Arial"/>
+              </a:rPr>
+              <a:t> and </a:t>
+            </a:r>
+            <a:r>
+              <a:rPr lang="it-IT" sz="800" b="1" dirty="0" err="1">
+                <a:solidFill>
+                  <a:schemeClr val="bg1"/>
+                </a:solidFill>
+                <a:latin typeface="Arial"/>
+                <a:cs typeface="Arial"/>
+              </a:rPr>
+              <a:t>parallel</a:t>
+            </a:r>
+            <a:r>
+              <a:rPr lang="it-IT" sz="800" b="1" dirty="0">
+                <a:solidFill>
+                  <a:schemeClr val="bg1"/>
+                </a:solidFill>
+                <a:latin typeface="Arial"/>
+                <a:cs typeface="Arial"/>
+              </a:rPr>
+              <a:t> </a:t>
+            </a:r>
+            <a:r>
+              <a:rPr lang="it-IT" sz="800" b="1" dirty="0" err="1">
+                <a:solidFill>
+                  <a:schemeClr val="bg1"/>
+                </a:solidFill>
+                <a:latin typeface="Arial"/>
+                <a:cs typeface="Arial"/>
+              </a:rPr>
+              <a:t>version</a:t>
+            </a:r>
+            <a:endParaRPr lang="it-IT" sz="800" b="1" dirty="0">
+              <a:solidFill>
+                <a:schemeClr val="bg1"/>
+              </a:solidFill>
+              <a:latin typeface="Arial"/>
+              <a:cs typeface="Arial"/>
+            </a:endParaRPr>
+          </a:p>
+        </p:txBody>
+      </p:sp>
+      <p:sp>
+        <p:nvSpPr>
+          <p:cNvPr id="14" name="CasellaDiTesto 13"/>
+          <p:cNvSpPr txBox="1"/>
+          <p:nvPr/>
+        </p:nvSpPr>
+        <p:spPr>
+          <a:xfrm>
+            <a:off x="7082015" y="403482"/>
+            <a:ext cx="1621846" cy="492443"/>
+          </a:xfrm>
+          <a:prstGeom prst="rect">
+            <a:avLst/>
+          </a:prstGeom>
+          <a:noFill/>
+        </p:spPr>
+        <p:txBody>
+          <a:bodyPr wrap="none" rtlCol="0">
+            <a:spAutoFit/>
+          </a:bodyPr>
+          <a:lstStyle/>
+          <a:p>
+            <a:pPr algn="r"/>
+            <a:r>
+              <a:rPr lang="it-IT" sz="800" dirty="0">
+                <a:solidFill>
+                  <a:schemeClr val="bg1"/>
+                </a:solidFill>
+                <a:latin typeface="Arial"/>
+                <a:cs typeface="Arial"/>
+              </a:rPr>
+              <a:t>Firenze – 12/1/2023</a:t>
+            </a:r>
+          </a:p>
+          <a:p>
+            <a:endParaRPr lang="it-IT" dirty="0"/>
+          </a:p>
+        </p:txBody>
+      </p:sp>
+      <p:pic>
+        <p:nvPicPr>
+          <p:cNvPr id="4" name="Immagine 3" descr="Immagine che contiene tavolo&#10;&#10;Descrizione generata automaticamente">
+            <a:extLst>
+              <a:ext uri="{FF2B5EF4-FFF2-40B4-BE49-F238E27FC236}">
+                <a16:creationId xmlns:a16="http://schemas.microsoft.com/office/drawing/2014/main" id="{62A8F913-CDAF-E019-492A-723D2B8125F3}"/>
+              </a:ext>
+            </a:extLst>
+          </p:cNvPr>
+          <p:cNvPicPr>
+            <a:picLocks noChangeAspect="1"/>
+          </p:cNvPicPr>
+          <p:nvPr/>
+        </p:nvPicPr>
+        <p:blipFill>
+          <a:blip r:embed="rId4"/>
+          <a:stretch>
+            <a:fillRect/>
+          </a:stretch>
+        </p:blipFill>
+        <p:spPr>
+          <a:xfrm>
+            <a:off x="680409" y="2166778"/>
+            <a:ext cx="3867349" cy="1987652"/>
+          </a:xfrm>
+          <a:prstGeom prst="rect">
+            <a:avLst/>
+          </a:prstGeom>
+        </p:spPr>
+      </p:pic>
+      <p:pic>
+        <p:nvPicPr>
+          <p:cNvPr id="9" name="Immagine 8" descr="Immagine che contiene tavolo&#10;&#10;Descrizione generata automaticamente">
+            <a:extLst>
+              <a:ext uri="{FF2B5EF4-FFF2-40B4-BE49-F238E27FC236}">
+                <a16:creationId xmlns:a16="http://schemas.microsoft.com/office/drawing/2014/main" id="{0EEB512E-6B4B-C904-B168-99D0DDB8D0D8}"/>
+              </a:ext>
+            </a:extLst>
+          </p:cNvPr>
+          <p:cNvPicPr>
+            <a:picLocks noChangeAspect="1"/>
+          </p:cNvPicPr>
+          <p:nvPr/>
+        </p:nvPicPr>
+        <p:blipFill>
+          <a:blip r:embed="rId5"/>
+          <a:stretch>
+            <a:fillRect/>
+          </a:stretch>
+        </p:blipFill>
+        <p:spPr>
+          <a:xfrm>
+            <a:off x="4764170" y="2090574"/>
+            <a:ext cx="3949903" cy="2063856"/>
+          </a:xfrm>
+          <a:prstGeom prst="rect">
+            <a:avLst/>
+          </a:prstGeom>
+        </p:spPr>
+      </p:pic>
+      <p:pic>
+        <p:nvPicPr>
+          <p:cNvPr id="17" name="Immagine 16" descr="Immagine che contiene tavolo&#10;&#10;Descrizione generata automaticamente">
+            <a:extLst>
+              <a:ext uri="{FF2B5EF4-FFF2-40B4-BE49-F238E27FC236}">
+                <a16:creationId xmlns:a16="http://schemas.microsoft.com/office/drawing/2014/main" id="{E240C152-19CE-0A44-CC8F-043203FACF0E}"/>
+              </a:ext>
+            </a:extLst>
+          </p:cNvPr>
+          <p:cNvPicPr>
+            <a:picLocks noChangeAspect="1"/>
+          </p:cNvPicPr>
+          <p:nvPr/>
+        </p:nvPicPr>
+        <p:blipFill>
+          <a:blip r:embed="rId6"/>
+          <a:stretch>
+            <a:fillRect/>
+          </a:stretch>
+        </p:blipFill>
+        <p:spPr>
+          <a:xfrm>
+            <a:off x="559753" y="4349647"/>
+            <a:ext cx="4026107" cy="2006703"/>
+          </a:xfrm>
+          <a:prstGeom prst="rect">
+            <a:avLst/>
+          </a:prstGeom>
+        </p:spPr>
+      </p:pic>
+      <p:pic>
+        <p:nvPicPr>
+          <p:cNvPr id="20" name="Immagine 19" descr="Immagine che contiene tavolo&#10;&#10;Descrizione generata automaticamente">
+            <a:extLst>
+              <a:ext uri="{FF2B5EF4-FFF2-40B4-BE49-F238E27FC236}">
+                <a16:creationId xmlns:a16="http://schemas.microsoft.com/office/drawing/2014/main" id="{D31E6910-9C14-F2A9-48D1-BD2A1AA0F267}"/>
+              </a:ext>
+            </a:extLst>
+          </p:cNvPr>
+          <p:cNvPicPr>
+            <a:picLocks noChangeAspect="1"/>
+          </p:cNvPicPr>
+          <p:nvPr/>
+        </p:nvPicPr>
+        <p:blipFill>
+          <a:blip r:embed="rId7"/>
+          <a:stretch>
+            <a:fillRect/>
+          </a:stretch>
+        </p:blipFill>
+        <p:spPr>
+          <a:xfrm>
+            <a:off x="4639969" y="4400449"/>
+            <a:ext cx="3988005" cy="1905098"/>
+          </a:xfrm>
+          <a:prstGeom prst="rect">
+            <a:avLst/>
+          </a:prstGeom>
+        </p:spPr>
+      </p:pic>
+    </p:spTree>
+    <p:extLst>
+      <p:ext uri="{BB962C8B-B14F-4D97-AF65-F5344CB8AC3E}">
+        <p14:creationId xmlns:p14="http://schemas.microsoft.com/office/powerpoint/2010/main" val="1119411354"/>
       </p:ext>
     </p:extLst>
   </p:cSld>

</xml_diff>

<commit_message>
fix indentation + screenshots
</commit_message>
<xml_diff>
--- a/presentation/KMeansClustering.pptx
+++ b/presentation/KMeansClustering.pptx
@@ -251,7 +251,7 @@
             <a:fld id="{45BF3CCC-77DD-F84F-A249-CA3C5045A043}" type="datetime1">
               <a:rPr lang="it-IT" smtClean="0"/>
               <a:pPr/>
-              <a:t>22/01/2023</a:t>
+              <a:t>28/01/2023</a:t>
             </a:fld>
             <a:endParaRPr lang="it-IT"/>
           </a:p>
@@ -419,7 +419,7 @@
             <a:fld id="{FE692227-D6DC-FD45-9507-DB2BAD58473C}" type="datetime1">
               <a:rPr lang="it-IT" smtClean="0"/>
               <a:pPr/>
-              <a:t>22/01/2023</a:t>
+              <a:t>28/01/2023</a:t>
             </a:fld>
             <a:endParaRPr lang="it-IT"/>
           </a:p>
@@ -1973,7 +1973,7 @@
             <a:fld id="{AD8BF249-6BAC-CD40-AAE9-334F110649E5}" type="datetimeFigureOut">
               <a:rPr lang="it-IT" smtClean="0"/>
               <a:pPr/>
-              <a:t>22/01/2023</a:t>
+              <a:t>28/01/2023</a:t>
             </a:fld>
             <a:endParaRPr lang="it-IT"/>
           </a:p>
@@ -2143,7 +2143,7 @@
             <a:fld id="{AD8BF249-6BAC-CD40-AAE9-334F110649E5}" type="datetimeFigureOut">
               <a:rPr lang="it-IT" smtClean="0"/>
               <a:pPr/>
-              <a:t>22/01/2023</a:t>
+              <a:t>28/01/2023</a:t>
             </a:fld>
             <a:endParaRPr lang="it-IT"/>
           </a:p>
@@ -2323,7 +2323,7 @@
             <a:fld id="{AD8BF249-6BAC-CD40-AAE9-334F110649E5}" type="datetimeFigureOut">
               <a:rPr lang="it-IT" smtClean="0"/>
               <a:pPr/>
-              <a:t>22/01/2023</a:t>
+              <a:t>28/01/2023</a:t>
             </a:fld>
             <a:endParaRPr lang="it-IT"/>
           </a:p>
@@ -2493,7 +2493,7 @@
             <a:fld id="{AD8BF249-6BAC-CD40-AAE9-334F110649E5}" type="datetimeFigureOut">
               <a:rPr lang="it-IT" smtClean="0"/>
               <a:pPr/>
-              <a:t>22/01/2023</a:t>
+              <a:t>28/01/2023</a:t>
             </a:fld>
             <a:endParaRPr lang="it-IT"/>
           </a:p>
@@ -2740,7 +2740,7 @@
             <a:fld id="{AD8BF249-6BAC-CD40-AAE9-334F110649E5}" type="datetimeFigureOut">
               <a:rPr lang="it-IT" smtClean="0"/>
               <a:pPr/>
-              <a:t>22/01/2023</a:t>
+              <a:t>28/01/2023</a:t>
             </a:fld>
             <a:endParaRPr lang="it-IT"/>
           </a:p>
@@ -3027,7 +3027,7 @@
             <a:fld id="{AD8BF249-6BAC-CD40-AAE9-334F110649E5}" type="datetimeFigureOut">
               <a:rPr lang="it-IT" smtClean="0"/>
               <a:pPr/>
-              <a:t>22/01/2023</a:t>
+              <a:t>28/01/2023</a:t>
             </a:fld>
             <a:endParaRPr lang="it-IT"/>
           </a:p>
@@ -3448,7 +3448,7 @@
             <a:fld id="{AD8BF249-6BAC-CD40-AAE9-334F110649E5}" type="datetimeFigureOut">
               <a:rPr lang="it-IT" smtClean="0"/>
               <a:pPr/>
-              <a:t>22/01/2023</a:t>
+              <a:t>28/01/2023</a:t>
             </a:fld>
             <a:endParaRPr lang="it-IT"/>
           </a:p>
@@ -3567,7 +3567,7 @@
             <a:fld id="{AD8BF249-6BAC-CD40-AAE9-334F110649E5}" type="datetimeFigureOut">
               <a:rPr lang="it-IT" smtClean="0"/>
               <a:pPr/>
-              <a:t>22/01/2023</a:t>
+              <a:t>28/01/2023</a:t>
             </a:fld>
             <a:endParaRPr lang="it-IT"/>
           </a:p>
@@ -3664,7 +3664,7 @@
             <a:fld id="{AD8BF249-6BAC-CD40-AAE9-334F110649E5}" type="datetimeFigureOut">
               <a:rPr lang="it-IT" smtClean="0"/>
               <a:pPr/>
-              <a:t>22/01/2023</a:t>
+              <a:t>28/01/2023</a:t>
             </a:fld>
             <a:endParaRPr lang="it-IT"/>
           </a:p>
@@ -3941,7 +3941,7 @@
             <a:fld id="{AD8BF249-6BAC-CD40-AAE9-334F110649E5}" type="datetimeFigureOut">
               <a:rPr lang="it-IT" smtClean="0"/>
               <a:pPr/>
-              <a:t>22/01/2023</a:t>
+              <a:t>28/01/2023</a:t>
             </a:fld>
             <a:endParaRPr lang="it-IT"/>
           </a:p>
@@ -4195,7 +4195,7 @@
             <a:fld id="{AD8BF249-6BAC-CD40-AAE9-334F110649E5}" type="datetimeFigureOut">
               <a:rPr lang="it-IT" smtClean="0"/>
               <a:pPr/>
-              <a:t>22/01/2023</a:t>
+              <a:t>28/01/2023</a:t>
             </a:fld>
             <a:endParaRPr lang="it-IT"/>
           </a:p>
@@ -4408,7 +4408,7 @@
             <a:fld id="{AD8BF249-6BAC-CD40-AAE9-334F110649E5}" type="datetimeFigureOut">
               <a:rPr lang="it-IT" smtClean="0"/>
               <a:pPr/>
-              <a:t>22/01/2023</a:t>
+              <a:t>28/01/2023</a:t>
             </a:fld>
             <a:endParaRPr lang="it-IT"/>
           </a:p>
@@ -11085,10 +11085,10 @@
       </p:sp>
       <p:pic>
         <p:nvPicPr>
-          <p:cNvPr id="5" name="Immagine 4" descr="Immagine che contiene testo&#10;&#10;Descrizione generata automaticamente">
+          <p:cNvPr id="4" name="Immagine 3" descr="Immagine che contiene testo&#10;&#10;Descrizione generata automaticamente">
             <a:extLst>
               <a:ext uri="{FF2B5EF4-FFF2-40B4-BE49-F238E27FC236}">
-                <a16:creationId xmlns:a16="http://schemas.microsoft.com/office/drawing/2014/main" id="{AEA41085-5E6D-6448-F892-C85E28AED604}"/>
+                <a16:creationId xmlns:a16="http://schemas.microsoft.com/office/drawing/2014/main" id="{234553B5-4133-491B-9E0F-B6CA2F7A7578}"/>
               </a:ext>
             </a:extLst>
           </p:cNvPr>
@@ -11105,8 +11105,8 @@
         </p:blipFill>
         <p:spPr>
           <a:xfrm>
-            <a:off x="2177927" y="2166778"/>
-            <a:ext cx="4788146" cy="4464279"/>
+            <a:off x="2293869" y="2066686"/>
+            <a:ext cx="4788146" cy="4654789"/>
           </a:xfrm>
           <a:prstGeom prst="rect">
             <a:avLst/>
@@ -11628,10 +11628,10 @@
       </p:sp>
       <p:pic>
         <p:nvPicPr>
-          <p:cNvPr id="13" name="Immagine 12" descr="Immagine che contiene testo&#10;&#10;Descrizione generata automaticamente">
+          <p:cNvPr id="4" name="Immagine 3" descr="Immagine che contiene testo&#10;&#10;Descrizione generata automaticamente">
             <a:extLst>
               <a:ext uri="{FF2B5EF4-FFF2-40B4-BE49-F238E27FC236}">
-                <a16:creationId xmlns:a16="http://schemas.microsoft.com/office/drawing/2014/main" id="{72149DE7-9165-D7C4-3C65-B86F0C37DD03}"/>
+                <a16:creationId xmlns:a16="http://schemas.microsoft.com/office/drawing/2014/main" id="{C4EC2B73-BD74-FF5B-7899-170E2C900162}"/>
               </a:ext>
             </a:extLst>
           </p:cNvPr>
@@ -11648,8 +11648,8 @@
         </p:blipFill>
         <p:spPr>
           <a:xfrm>
-            <a:off x="699915" y="3898526"/>
-            <a:ext cx="7476645" cy="2694143"/>
+            <a:off x="190040" y="4071706"/>
+            <a:ext cx="8953960" cy="2038455"/>
           </a:xfrm>
           <a:prstGeom prst="rect">
             <a:avLst/>

</xml_diff>